<commit_message>
Update ADS PROJECT 3 GROUP TEN.pptx
</commit_message>
<xml_diff>
--- a/doc/ADS PROJECT 3 GROUP TEN.pptx
+++ b/doc/ADS PROJECT 3 GROUP TEN.pptx
@@ -118,7 +118,7 @@
   </p:defaultTextStyle>
   <p:extLst>
     <p:ext uri="{EFAFB233-063F-42B5-8137-9DF3F51BA10A}">
-      <p15:sldGuideLst xmlns:p15="http://schemas.microsoft.com/office/powerpoint/2012/main" xmlns=""/>
+      <p15:sldGuideLst xmlns="" xmlns:p15="http://schemas.microsoft.com/office/powerpoint/2012/main"/>
     </p:ext>
   </p:extLst>
 </p:presentation>
@@ -5475,20 +5475,7 @@
                     <a:latin typeface="微软雅黑" panose="020B0503020204020204" charset="-122"/>
                     <a:ea typeface="微软雅黑" panose="020B0503020204020204" charset="-122"/>
                   </a:rPr>
-                  <a:t>Baseline </a:t>
-                </a:r>
-                <a:r>
-                  <a:rPr lang="en-US" altLang="zh-CN" sz="1500" b="1" dirty="0" smtClean="0">
-                    <a:solidFill>
-                      <a:schemeClr val="tx1">
-                        <a:lumMod val="65000"/>
-                        <a:lumOff val="35000"/>
-                      </a:schemeClr>
-                    </a:solidFill>
-                    <a:latin typeface="微软雅黑" panose="020B0503020204020204" charset="-122"/>
-                    <a:ea typeface="微软雅黑" panose="020B0503020204020204" charset="-122"/>
-                  </a:rPr>
-                  <a:t>Model</a:t>
+                  <a:t>Baseline Model</a:t>
                 </a:r>
                 <a:endParaRPr kumimoji="0" lang="zh-CN" altLang="en-US" sz="1500" b="1" i="0" u="none" strike="noStrike" cap="none" spc="0" normalizeH="0" baseline="0" dirty="0">
                   <a:solidFill>
@@ -6592,17 +6579,7 @@
                 <a:latin typeface="微软雅黑" panose="020B0503020204020204" charset="-122"/>
                 <a:ea typeface="微软雅黑" panose="020B0503020204020204" charset="-122"/>
               </a:rPr>
-              <a:t>Baseline </a:t>
-            </a:r>
-            <a:r>
-              <a:rPr lang="en-US" altLang="zh-CN" sz="2800" dirty="0" smtClean="0">
-                <a:solidFill>
-                  <a:srgbClr val="22374C"/>
-                </a:solidFill>
-                <a:latin typeface="微软雅黑" panose="020B0503020204020204" charset="-122"/>
-                <a:ea typeface="微软雅黑" panose="020B0503020204020204" charset="-122"/>
-              </a:rPr>
-              <a:t>Model</a:t>
+              <a:t>Baseline Model</a:t>
             </a:r>
           </a:p>
           <a:p>
@@ -7152,7 +7129,7 @@
         <p:spPr>
           <a:xfrm>
             <a:off x="621234" y="2198748"/>
-            <a:ext cx="2352311" cy="1477328"/>
+            <a:ext cx="7636287" cy="923330"/>
           </a:xfrm>
           <a:prstGeom prst="rect">
             <a:avLst/>
@@ -18987,7 +18964,7 @@
   <a:extraClrSchemeLst/>
   <a:extLst>
     <a:ext uri="{05A4C25C-085E-4340-85A3-A5531E510DB2}">
-      <thm15:themeFamily xmlns:thm15="http://schemas.microsoft.com/office/thememl/2012/main" xmlns="" name="Office Theme" id="{62F939B6-93AF-4DB8-9C6B-D6C7DFDC589F}" vid="{4A3C46E8-61CC-4603-A589-7422A47A8E4A}"/>
+      <thm15:themeFamily xmlns="" xmlns:thm15="http://schemas.microsoft.com/office/thememl/2012/main" name="Office Theme" id="{62F939B6-93AF-4DB8-9C6B-D6C7DFDC589F}" vid="{4A3C46E8-61CC-4603-A589-7422A47A8E4A}"/>
     </a:ext>
   </a:extLst>
 </a:theme>
@@ -19248,7 +19225,7 @@
   <a:extraClrSchemeLst/>
   <a:extLst>
     <a:ext uri="{05A4C25C-085E-4340-85A3-A5531E510DB2}">
-      <thm15:themeFamily xmlns:thm15="http://schemas.microsoft.com/office/thememl/2012/main" xmlns="" name="Office Theme" id="{62F939B6-93AF-4DB8-9C6B-D6C7DFDC589F}" vid="{4A3C46E8-61CC-4603-A589-7422A47A8E4A}"/>
+      <thm15:themeFamily xmlns="" xmlns:thm15="http://schemas.microsoft.com/office/thememl/2012/main" name="Office Theme" id="{62F939B6-93AF-4DB8-9C6B-D6C7DFDC589F}" vid="{4A3C46E8-61CC-4603-A589-7422A47A8E4A}"/>
     </a:ext>
   </a:extLst>
 </a:theme>

</xml_diff>